<commit_message>
updated piano notes and other files
</commit_message>
<xml_diff>
--- a/Licenta2020CrivoiAndrei/Crivoi Andrei Prezentare Licenta.pptx
+++ b/Licenta2020CrivoiAndrei/Crivoi Andrei Prezentare Licenta.pptx
@@ -5,7 +5,7 @@
     <p:sldMasterId id="2147483690" r:id="rId1"/>
   </p:sldMasterIdLst>
   <p:notesMasterIdLst>
-    <p:notesMasterId r:id="rId13"/>
+    <p:notesMasterId r:id="rId12"/>
   </p:notesMasterIdLst>
   <p:sldIdLst>
     <p:sldId id="256" r:id="rId2"/>
@@ -14,11 +14,10 @@
     <p:sldId id="260" r:id="rId5"/>
     <p:sldId id="258" r:id="rId6"/>
     <p:sldId id="259" r:id="rId7"/>
-    <p:sldId id="261" r:id="rId8"/>
-    <p:sldId id="263" r:id="rId9"/>
-    <p:sldId id="264" r:id="rId10"/>
-    <p:sldId id="262" r:id="rId11"/>
-    <p:sldId id="266" r:id="rId12"/>
+    <p:sldId id="264" r:id="rId8"/>
+    <p:sldId id="262" r:id="rId9"/>
+    <p:sldId id="266" r:id="rId10"/>
+    <p:sldId id="269" r:id="rId11"/>
   </p:sldIdLst>
   <p:sldSz cx="12192000" cy="6858000"/>
   <p:notesSz cx="6858000" cy="9144000"/>
@@ -207,7 +206,7 @@
           <a:p>
             <a:fld id="{A4382D98-FC04-4C63-8970-18303CA92AC7}" type="datetimeFigureOut">
               <a:rPr lang="en-US" smtClean="0"/>
-              <a:t>05-Feb-20</a:t>
+              <a:t>11-Feb-20</a:t>
             </a:fld>
             <a:endParaRPr lang="en-US"/>
           </a:p>
@@ -787,7 +786,7 @@
           <a:p>
             <a:fld id="{B8249082-1355-4FA8-AA26-5D0D49FEC7D8}" type="datetimeFigureOut">
               <a:rPr lang="en-US" smtClean="0"/>
-              <a:t>05-Feb-20</a:t>
+              <a:t>11-Feb-20</a:t>
             </a:fld>
             <a:endParaRPr lang="en-US"/>
           </a:p>
@@ -995,7 +994,7 @@
           <a:p>
             <a:fld id="{B8249082-1355-4FA8-AA26-5D0D49FEC7D8}" type="datetimeFigureOut">
               <a:rPr lang="en-US" smtClean="0"/>
-              <a:t>05-Feb-20</a:t>
+              <a:t>11-Feb-20</a:t>
             </a:fld>
             <a:endParaRPr lang="en-US"/>
           </a:p>
@@ -1253,7 +1252,7 @@
           <a:p>
             <a:fld id="{B8249082-1355-4FA8-AA26-5D0D49FEC7D8}" type="datetimeFigureOut">
               <a:rPr lang="en-US" smtClean="0"/>
-              <a:t>05-Feb-20</a:t>
+              <a:t>11-Feb-20</a:t>
             </a:fld>
             <a:endParaRPr lang="en-US"/>
           </a:p>
@@ -1423,7 +1422,7 @@
           <a:p>
             <a:fld id="{B8249082-1355-4FA8-AA26-5D0D49FEC7D8}" type="datetimeFigureOut">
               <a:rPr lang="en-US" smtClean="0"/>
-              <a:t>05-Feb-20</a:t>
+              <a:t>11-Feb-20</a:t>
             </a:fld>
             <a:endParaRPr lang="en-US"/>
           </a:p>
@@ -1760,7 +1759,7 @@
           <a:p>
             <a:fld id="{B8249082-1355-4FA8-AA26-5D0D49FEC7D8}" type="datetimeFigureOut">
               <a:rPr lang="en-US" smtClean="0"/>
-              <a:t>05-Feb-20</a:t>
+              <a:t>11-Feb-20</a:t>
             </a:fld>
             <a:endParaRPr lang="en-US"/>
           </a:p>
@@ -2035,7 +2034,7 @@
           <a:p>
             <a:fld id="{B8249082-1355-4FA8-AA26-5D0D49FEC7D8}" type="datetimeFigureOut">
               <a:rPr lang="en-US" smtClean="0"/>
-              <a:t>05-Feb-20</a:t>
+              <a:t>11-Feb-20</a:t>
             </a:fld>
             <a:endParaRPr lang="en-US"/>
           </a:p>
@@ -2414,7 +2413,7 @@
           <a:p>
             <a:fld id="{B8249082-1355-4FA8-AA26-5D0D49FEC7D8}" type="datetimeFigureOut">
               <a:rPr lang="en-US" smtClean="0"/>
-              <a:t>05-Feb-20</a:t>
+              <a:t>11-Feb-20</a:t>
             </a:fld>
             <a:endParaRPr lang="en-US"/>
           </a:p>
@@ -2532,7 +2531,7 @@
           <a:p>
             <a:fld id="{B8249082-1355-4FA8-AA26-5D0D49FEC7D8}" type="datetimeFigureOut">
               <a:rPr lang="en-US" smtClean="0"/>
-              <a:t>05-Feb-20</a:t>
+              <a:t>11-Feb-20</a:t>
             </a:fld>
             <a:endParaRPr lang="en-US"/>
           </a:p>
@@ -2705,7 +2704,7 @@
           <a:p>
             <a:fld id="{B8249082-1355-4FA8-AA26-5D0D49FEC7D8}" type="datetimeFigureOut">
               <a:rPr lang="en-US" smtClean="0"/>
-              <a:t>05-Feb-20</a:t>
+              <a:t>11-Feb-20</a:t>
             </a:fld>
             <a:endParaRPr lang="en-US"/>
           </a:p>
@@ -3061,7 +3060,7 @@
           <a:p>
             <a:fld id="{B8249082-1355-4FA8-AA26-5D0D49FEC7D8}" type="datetimeFigureOut">
               <a:rPr lang="en-US" smtClean="0"/>
-              <a:t>05-Feb-20</a:t>
+              <a:t>11-Feb-20</a:t>
             </a:fld>
             <a:endParaRPr lang="en-US"/>
           </a:p>
@@ -3440,7 +3439,7 @@
           <a:p>
             <a:fld id="{B8249082-1355-4FA8-AA26-5D0D49FEC7D8}" type="datetimeFigureOut">
               <a:rPr lang="en-US" smtClean="0"/>
-              <a:t>05-Feb-20</a:t>
+              <a:t>11-Feb-20</a:t>
             </a:fld>
             <a:endParaRPr lang="en-US"/>
           </a:p>
@@ -3729,7 +3728,7 @@
           <a:p>
             <a:fld id="{B8249082-1355-4FA8-AA26-5D0D49FEC7D8}" type="datetimeFigureOut">
               <a:rPr lang="en-US" smtClean="0"/>
-              <a:t>05-Feb-20</a:t>
+              <a:t>11-Feb-20</a:t>
             </a:fld>
             <a:endParaRPr lang="en-US"/>
           </a:p>
@@ -4459,19 +4458,7 @@
           <a:bodyPr/>
           <a:lstStyle/>
           <a:p>
-            <a:r>
-              <a:rPr lang="ro-RO" dirty="0" smtClean="0">
-                <a:solidFill>
-                  <a:schemeClr val="tx1"/>
-                </a:solidFill>
-              </a:rPr>
-              <a:t>Compararea cu alte partituri</a:t>
-            </a:r>
-            <a:endParaRPr lang="ro-RO" dirty="0">
-              <a:solidFill>
-                <a:schemeClr val="tx1"/>
-              </a:solidFill>
-            </a:endParaRPr>
+            <a:endParaRPr lang="ro-RO"/>
           </a:p>
         </p:txBody>
       </p:sp>
@@ -4490,184 +4477,20 @@
           <a:bodyPr/>
           <a:lstStyle/>
           <a:p>
-            <a:r>
-              <a:rPr lang="ro-RO" dirty="0">
-                <a:solidFill>
-                  <a:schemeClr val="tx1"/>
-                </a:solidFill>
-                <a:latin typeface="Times New Roman" panose="02020603050405020304" pitchFamily="18" charset="0"/>
-                <a:cs typeface="Times New Roman" panose="02020603050405020304" pitchFamily="18" charset="0"/>
-              </a:rPr>
-              <a:t>Inovaţia adusă de aplicaţia PianoFollower este interfaţa de comparat partituri. Nu am găsit în nicio altă aplicaţie un modul de comparat partituri, înafară de MuseScore, dar, chiar şi acolo, compararea se face doar în mod text şi nu în mod grafic.</a:t>
-            </a:r>
-            <a:endParaRPr lang="en-US" dirty="0">
-              <a:solidFill>
-                <a:schemeClr val="tx1"/>
-              </a:solidFill>
-              <a:latin typeface="Times New Roman" panose="02020603050405020304" pitchFamily="18" charset="0"/>
-              <a:cs typeface="Times New Roman" panose="02020603050405020304" pitchFamily="18" charset="0"/>
-            </a:endParaRPr>
-          </a:p>
-          <a:p>
-            <a:endParaRPr lang="ro-RO" dirty="0"/>
-          </a:p>
-        </p:txBody>
-      </p:sp>
-      <p:pic>
-        <p:nvPicPr>
-          <p:cNvPr id="1044" name="Picture 1043"/>
-          <p:cNvPicPr>
-            <a:picLocks noChangeAspect="1"/>
-          </p:cNvPicPr>
-          <p:nvPr/>
-        </p:nvPicPr>
-        <p:blipFill>
-          <a:blip r:embed="rId2" cstate="print">
-            <a:extLst>
-              <a:ext uri="{28A0092B-C50C-407E-A947-70E740481C1C}">
-                <a14:useLocalDpi xmlns:a14="http://schemas.microsoft.com/office/drawing/2010/main" val="0"/>
-              </a:ext>
-            </a:extLst>
-          </a:blip>
-          <a:stretch>
-            <a:fillRect/>
-          </a:stretch>
-        </p:blipFill>
-        <p:spPr>
-          <a:xfrm>
-            <a:off x="1097280" y="3176568"/>
-            <a:ext cx="5069237" cy="2692526"/>
-          </a:xfrm>
-          <a:prstGeom prst="rect">
-            <a:avLst/>
-          </a:prstGeom>
-        </p:spPr>
-      </p:pic>
-      <p:sp>
-        <p:nvSpPr>
-          <p:cNvPr id="1045" name="TextBox 1044"/>
-          <p:cNvSpPr txBox="1"/>
-          <p:nvPr/>
-        </p:nvSpPr>
-        <p:spPr>
-          <a:xfrm>
-            <a:off x="6473952" y="3176568"/>
-            <a:ext cx="3712464" cy="1938992"/>
-          </a:xfrm>
-          <a:prstGeom prst="rect">
-            <a:avLst/>
-          </a:prstGeom>
-          <a:noFill/>
-        </p:spPr>
-        <p:txBody>
-          <a:bodyPr wrap="square" rtlCol="0">
-            <a:spAutoFit/>
-          </a:bodyPr>
-          <a:lstStyle/>
-          <a:p>
-            <a:r>
-              <a:rPr lang="ro-RO" sz="2000" dirty="0">
-                <a:latin typeface="Times New Roman" panose="02020603050405020304" pitchFamily="18" charset="0"/>
-                <a:cs typeface="Times New Roman" panose="02020603050405020304" pitchFamily="18" charset="0"/>
-              </a:rPr>
-              <a:t>Acest exemplu prezintă compararea a două partituri. După cum se poate observa, graficele reprezentate de axele note şi timp sunt identice, fapt ce semnalează că şi partiturile input sunt identice.</a:t>
-            </a:r>
-            <a:endParaRPr lang="en-US" sz="2000" dirty="0">
-              <a:latin typeface="Times New Roman" panose="02020603050405020304" pitchFamily="18" charset="0"/>
-              <a:cs typeface="Times New Roman" panose="02020603050405020304" pitchFamily="18" charset="0"/>
-            </a:endParaRPr>
+            <a:endParaRPr lang="ro-RO"/>
           </a:p>
         </p:txBody>
       </p:sp>
     </p:spTree>
     <p:extLst>
       <p:ext uri="{BB962C8B-B14F-4D97-AF65-F5344CB8AC3E}">
-        <p14:creationId xmlns:p14="http://schemas.microsoft.com/office/powerpoint/2010/main" val="3998745293"/>
+        <p14:creationId xmlns:p14="http://schemas.microsoft.com/office/powerpoint/2010/main" val="786175429"/>
       </p:ext>
     </p:extLst>
   </p:cSld>
   <p:clrMapOvr>
     <a:masterClrMapping/>
   </p:clrMapOvr>
-  <p:timing>
-    <p:tnLst>
-      <p:par>
-        <p:cTn id="1" dur="indefinite" restart="never" nodeType="tmRoot"/>
-      </p:par>
-    </p:tnLst>
-  </p:timing>
-</p:sld>
-</file>
-
-<file path=ppt/slides/slide11.xml><?xml version="1.0" encoding="utf-8"?>
-<p:sld xmlns:a="http://schemas.openxmlformats.org/drawingml/2006/main" xmlns:r="http://schemas.openxmlformats.org/officeDocument/2006/relationships" xmlns:p="http://schemas.openxmlformats.org/presentationml/2006/main">
-  <p:cSld>
-    <p:spTree>
-      <p:nvGrpSpPr>
-        <p:cNvPr id="1" name=""/>
-        <p:cNvGrpSpPr/>
-        <p:nvPr/>
-      </p:nvGrpSpPr>
-      <p:grpSpPr>
-        <a:xfrm>
-          <a:off x="0" y="0"/>
-          <a:ext cx="0" cy="0"/>
-          <a:chOff x="0" y="0"/>
-          <a:chExt cx="0" cy="0"/>
-        </a:xfrm>
-      </p:grpSpPr>
-      <p:sp>
-        <p:nvSpPr>
-          <p:cNvPr id="2" name="Title 1"/>
-          <p:cNvSpPr>
-            <a:spLocks noGrp="1"/>
-          </p:cNvSpPr>
-          <p:nvPr>
-            <p:ph type="title"/>
-          </p:nvPr>
-        </p:nvSpPr>
-        <p:spPr/>
-        <p:txBody>
-          <a:bodyPr/>
-          <a:lstStyle/>
-          <a:p>
-            <a:r>
-              <a:rPr lang="en-US" dirty="0" smtClean="0">
-                <a:solidFill>
-                  <a:schemeClr val="tx1"/>
-                </a:solidFill>
-                <a:latin typeface="Times New Roman" panose="02020603050405020304" pitchFamily="18" charset="0"/>
-                <a:cs typeface="Times New Roman" panose="02020603050405020304" pitchFamily="18" charset="0"/>
-              </a:rPr>
-              <a:t>Demo</a:t>
-            </a:r>
-            <a:endParaRPr lang="ro-RO" dirty="0">
-              <a:solidFill>
-                <a:schemeClr val="tx1"/>
-              </a:solidFill>
-              <a:latin typeface="Times New Roman" panose="02020603050405020304" pitchFamily="18" charset="0"/>
-              <a:cs typeface="Times New Roman" panose="02020603050405020304" pitchFamily="18" charset="0"/>
-            </a:endParaRPr>
-          </a:p>
-        </p:txBody>
-      </p:sp>
-    </p:spTree>
-    <p:extLst>
-      <p:ext uri="{BB962C8B-B14F-4D97-AF65-F5344CB8AC3E}">
-        <p14:creationId xmlns:p14="http://schemas.microsoft.com/office/powerpoint/2010/main" val="602976053"/>
-      </p:ext>
-    </p:extLst>
-  </p:cSld>
-  <p:clrMapOvr>
-    <a:masterClrMapping/>
-  </p:clrMapOvr>
-  <p:timing>
-    <p:tnLst>
-      <p:par>
-        <p:cTn id="1" dur="indefinite" restart="never" nodeType="tmRoot"/>
-      </p:par>
-    </p:tnLst>
-  </p:timing>
 </p:sld>
 </file>
 
@@ -4743,10 +4566,15 @@
         </p:spPr>
         <p:txBody>
           <a:bodyPr>
-            <a:normAutofit/>
+            <a:normAutofit fontScale="92500" lnSpcReduction="10000"/>
           </a:bodyPr>
           <a:lstStyle/>
           <a:p>
+            <a:pPr>
+              <a:lnSpc>
+                <a:spcPct val="120000"/>
+              </a:lnSpc>
+            </a:pPr>
             <a:r>
               <a:rPr lang="ro-RO" dirty="0">
                 <a:solidFill>
@@ -4755,7 +4583,36 @@
                 <a:latin typeface="Times New Roman" panose="02020603050405020304" pitchFamily="18" charset="0"/>
                 <a:cs typeface="Times New Roman" panose="02020603050405020304" pitchFamily="18" charset="0"/>
               </a:rPr>
-              <a:t>Aplicaţia PianoFollower aduce utilizatorilor posibilitatea de a lucra cu fişiere audio WAV, fişiere MIDI sau fişiere MXL şi prezintă o soluţie experimentală pentru problema transcrierii muzicale (procedeul de conversie de la o reprezentare audio într-una MIDI sau într-o partitură).</a:t>
+              <a:t>Aplicaţia PianoFollower aduce utilizatorilor posibilitatea de a lucra cu fişiere audio WAV, fişiere MIDI sau fişiere MXL şi prezintă o soluţie experimentală pentru problema transcrierii muzicale (procedeul de conversie de la o reprezentare audio într-una MIDI sau într-o partitură</a:t>
+            </a:r>
+            <a:r>
+              <a:rPr lang="ro-RO" dirty="0" smtClean="0">
+                <a:solidFill>
+                  <a:schemeClr val="tx1"/>
+                </a:solidFill>
+                <a:latin typeface="Times New Roman" panose="02020603050405020304" pitchFamily="18" charset="0"/>
+                <a:cs typeface="Times New Roman" panose="02020603050405020304" pitchFamily="18" charset="0"/>
+              </a:rPr>
+              <a:t>).</a:t>
+            </a:r>
+            <a:endParaRPr lang="en-US" dirty="0" smtClean="0">
+              <a:solidFill>
+                <a:schemeClr val="tx1"/>
+              </a:solidFill>
+              <a:latin typeface="Times New Roman" panose="02020603050405020304" pitchFamily="18" charset="0"/>
+              <a:cs typeface="Times New Roman" panose="02020603050405020304" pitchFamily="18" charset="0"/>
+            </a:endParaRPr>
+          </a:p>
+          <a:p>
+            <a:r>
+              <a:rPr lang="ro-RO" dirty="0">
+                <a:solidFill>
+                  <a:schemeClr val="tx1"/>
+                </a:solidFill>
+                <a:latin typeface="Times New Roman" panose="02020603050405020304" pitchFamily="18" charset="0"/>
+                <a:cs typeface="Times New Roman" panose="02020603050405020304" pitchFamily="18" charset="0"/>
+              </a:rPr>
+              <a:t>Această aplicaţie prezintă următoarele funţionalităţi:</a:t>
             </a:r>
             <a:endParaRPr lang="en-US" dirty="0">
               <a:solidFill>
@@ -4766,6 +4623,13 @@
             </a:endParaRPr>
           </a:p>
           <a:p>
+            <a:pPr lvl="1">
+              <a:buClr>
+                <a:schemeClr val="tx2"/>
+              </a:buClr>
+              <a:buFont typeface="Arial" panose="020B0604020202020204" pitchFamily="34" charset="0"/>
+              <a:buChar char="•"/>
+            </a:pPr>
             <a:r>
               <a:rPr lang="ro-RO" dirty="0">
                 <a:solidFill>
@@ -4774,18 +4638,24 @@
                 <a:latin typeface="Times New Roman" panose="02020603050405020304" pitchFamily="18" charset="0"/>
                 <a:cs typeface="Times New Roman" panose="02020603050405020304" pitchFamily="18" charset="0"/>
               </a:rPr>
-              <a:t>Acesta este un procedeu </a:t>
-            </a:r>
-            <a:r>
-              <a:rPr lang="ro-RO" dirty="0" smtClean="0">
-                <a:solidFill>
-                  <a:schemeClr val="tx1"/>
-                </a:solidFill>
-                <a:latin typeface="Times New Roman" panose="02020603050405020304" pitchFamily="18" charset="0"/>
-                <a:cs typeface="Times New Roman" panose="02020603050405020304" pitchFamily="18" charset="0"/>
-              </a:rPr>
-              <a:t>complex </a:t>
-            </a:r>
+              <a:t>Import de fişiere WAV, MIDI, MXL</a:t>
+            </a:r>
+            <a:endParaRPr lang="en-US" dirty="0">
+              <a:solidFill>
+                <a:schemeClr val="tx1"/>
+              </a:solidFill>
+              <a:latin typeface="Times New Roman" panose="02020603050405020304" pitchFamily="18" charset="0"/>
+              <a:cs typeface="Times New Roman" panose="02020603050405020304" pitchFamily="18" charset="0"/>
+            </a:endParaRPr>
+          </a:p>
+          <a:p>
+            <a:pPr lvl="1">
+              <a:buClr>
+                <a:schemeClr val="tx2"/>
+              </a:buClr>
+              <a:buFont typeface="Arial" panose="020B0604020202020204" pitchFamily="34" charset="0"/>
+              <a:buChar char="•"/>
+            </a:pPr>
             <a:r>
               <a:rPr lang="ro-RO" dirty="0">
                 <a:solidFill>
@@ -4794,30 +4664,24 @@
                 <a:latin typeface="Times New Roman" panose="02020603050405020304" pitchFamily="18" charset="0"/>
                 <a:cs typeface="Times New Roman" panose="02020603050405020304" pitchFamily="18" charset="0"/>
               </a:rPr>
-              <a:t>pentru care se fac studii constant chiar şi în prezent, având în vedere dificultatea obţinerii unui rezultat precis. Pentru o melodie obişnuită, acest procedeu poate fi chiar imposibil datorită multitudinii de elemente (percuţii, chitări, synthuri, etc.) prezente, algoritmii de estimare neştiind să le diferenţieze, având în vedere că multe dintre ele se întind pe aceeaşi parte a spectrului de frecvenţe</a:t>
-            </a:r>
-            <a:r>
-              <a:rPr lang="ro-RO" dirty="0" smtClean="0">
-                <a:solidFill>
-                  <a:schemeClr val="tx1"/>
-                </a:solidFill>
-                <a:latin typeface="Times New Roman" panose="02020603050405020304" pitchFamily="18" charset="0"/>
-                <a:cs typeface="Times New Roman" panose="02020603050405020304" pitchFamily="18" charset="0"/>
-              </a:rPr>
-              <a:t>.</a:t>
-            </a:r>
-          </a:p>
-          <a:p>
-            <a:r>
-              <a:rPr lang="ro-RO" dirty="0" smtClean="0">
-                <a:solidFill>
-                  <a:schemeClr val="tx1"/>
-                </a:solidFill>
-                <a:latin typeface="Times New Roman" panose="02020603050405020304" pitchFamily="18" charset="0"/>
-                <a:cs typeface="Times New Roman" panose="02020603050405020304" pitchFamily="18" charset="0"/>
-              </a:rPr>
-              <a:t>Astfel, </a:t>
-            </a:r>
+              <a:t>Transcrierea de la WAV la MIDI sau MXL</a:t>
+            </a:r>
+            <a:endParaRPr lang="en-US" dirty="0">
+              <a:solidFill>
+                <a:schemeClr val="tx1"/>
+              </a:solidFill>
+              <a:latin typeface="Times New Roman" panose="02020603050405020304" pitchFamily="18" charset="0"/>
+              <a:cs typeface="Times New Roman" panose="02020603050405020304" pitchFamily="18" charset="0"/>
+            </a:endParaRPr>
+          </a:p>
+          <a:p>
+            <a:pPr lvl="1">
+              <a:buClr>
+                <a:schemeClr val="tx2"/>
+              </a:buClr>
+              <a:buFont typeface="Arial" panose="020B0604020202020204" pitchFamily="34" charset="0"/>
+              <a:buChar char="•"/>
+            </a:pPr>
             <a:r>
               <a:rPr lang="ro-RO" dirty="0">
                 <a:solidFill>
@@ -4826,18 +4690,24 @@
                 <a:latin typeface="Times New Roman" panose="02020603050405020304" pitchFamily="18" charset="0"/>
                 <a:cs typeface="Times New Roman" panose="02020603050405020304" pitchFamily="18" charset="0"/>
               </a:rPr>
-              <a:t>c</a:t>
-            </a:r>
-            <a:r>
-              <a:rPr lang="ro-RO" dirty="0" smtClean="0">
-                <a:solidFill>
-                  <a:schemeClr val="tx1"/>
-                </a:solidFill>
-                <a:latin typeface="Times New Roman" panose="02020603050405020304" pitchFamily="18" charset="0"/>
-                <a:cs typeface="Times New Roman" panose="02020603050405020304" pitchFamily="18" charset="0"/>
-              </a:rPr>
-              <a:t>ele </a:t>
-            </a:r>
+              <a:t>Conversie MIDI – MXL şi viceversa</a:t>
+            </a:r>
+            <a:endParaRPr lang="en-US" dirty="0">
+              <a:solidFill>
+                <a:schemeClr val="tx1"/>
+              </a:solidFill>
+              <a:latin typeface="Times New Roman" panose="02020603050405020304" pitchFamily="18" charset="0"/>
+              <a:cs typeface="Times New Roman" panose="02020603050405020304" pitchFamily="18" charset="0"/>
+            </a:endParaRPr>
+          </a:p>
+          <a:p>
+            <a:pPr lvl="1">
+              <a:buClr>
+                <a:schemeClr val="tx2"/>
+              </a:buClr>
+              <a:buFont typeface="Arial" panose="020B0604020202020204" pitchFamily="34" charset="0"/>
+              <a:buChar char="•"/>
+            </a:pPr>
             <a:r>
               <a:rPr lang="ro-RO" dirty="0">
                 <a:solidFill>
@@ -4846,9 +4716,9 @@
                 <a:latin typeface="Times New Roman" panose="02020603050405020304" pitchFamily="18" charset="0"/>
                 <a:cs typeface="Times New Roman" panose="02020603050405020304" pitchFamily="18" charset="0"/>
               </a:rPr>
-              <a:t>mai bune rezultate vor fi obţinute pentru înregistrări ce conţin un singur instrument ce nu conţine prea mult vibrato (de preferat pian) </a:t>
-            </a:r>
-            <a:endParaRPr lang="en-US" dirty="0" smtClean="0">
+              <a:t>Înregistrare audio extern</a:t>
+            </a:r>
+            <a:endParaRPr lang="en-US" dirty="0">
               <a:solidFill>
                 <a:schemeClr val="tx1"/>
               </a:solidFill>
@@ -4857,16 +4727,44 @@
             </a:endParaRPr>
           </a:p>
           <a:p>
-            <a:r>
-              <a:rPr lang="en-US" dirty="0" err="1" smtClean="0">
+            <a:pPr lvl="1">
+              <a:buClr>
+                <a:schemeClr val="tx2"/>
+              </a:buClr>
+              <a:buFont typeface="Arial" panose="020B0604020202020204" pitchFamily="34" charset="0"/>
+              <a:buChar char="•"/>
+            </a:pPr>
+            <a:r>
+              <a:rPr lang="ro-RO" dirty="0">
                 <a:solidFill>
                   <a:schemeClr val="tx1"/>
                 </a:solidFill>
                 <a:latin typeface="Times New Roman" panose="02020603050405020304" pitchFamily="18" charset="0"/>
                 <a:cs typeface="Times New Roman" panose="02020603050405020304" pitchFamily="18" charset="0"/>
               </a:rPr>
-              <a:t>Enumara</a:t>
-            </a:r>
+              <a:t>Înregistrarea unui clip de pian prin input MIDI, de la tastatură sau direct din frontendul aplicaţiei</a:t>
+            </a:r>
+            <a:endParaRPr lang="en-US" dirty="0">
+              <a:solidFill>
+                <a:schemeClr val="tx1"/>
+              </a:solidFill>
+              <a:latin typeface="Times New Roman" panose="02020603050405020304" pitchFamily="18" charset="0"/>
+              <a:cs typeface="Times New Roman" panose="02020603050405020304" pitchFamily="18" charset="0"/>
+            </a:endParaRPr>
+          </a:p>
+          <a:p>
+            <a:endParaRPr lang="en-US" sz="2200" dirty="0">
+              <a:solidFill>
+                <a:schemeClr val="tx1"/>
+              </a:solidFill>
+              <a:latin typeface="Times New Roman" panose="02020603050405020304" pitchFamily="18" charset="0"/>
+              <a:cs typeface="Times New Roman" panose="02020603050405020304" pitchFamily="18" charset="0"/>
+            </a:endParaRPr>
+          </a:p>
+          <a:p>
+            <a:pPr marL="0" indent="0">
+              <a:buNone/>
+            </a:pPr>
             <a:r>
               <a:rPr lang="en-US" dirty="0" smtClean="0">
                 <a:solidFill>
@@ -4877,28 +4775,6 @@
               </a:rPr>
               <a:t> </a:t>
             </a:r>
-            <a:r>
-              <a:rPr lang="en-US" dirty="0" err="1" smtClean="0">
-                <a:solidFill>
-                  <a:schemeClr val="tx1"/>
-                </a:solidFill>
-                <a:latin typeface="Times New Roman" panose="02020603050405020304" pitchFamily="18" charset="0"/>
-                <a:cs typeface="Times New Roman" panose="02020603050405020304" pitchFamily="18" charset="0"/>
-              </a:rPr>
-              <a:t>functionalitati</a:t>
-            </a:r>
-            <a:endParaRPr lang="en-US" dirty="0">
-              <a:solidFill>
-                <a:schemeClr val="tx1"/>
-              </a:solidFill>
-              <a:latin typeface="Times New Roman" panose="02020603050405020304" pitchFamily="18" charset="0"/>
-              <a:cs typeface="Times New Roman" panose="02020603050405020304" pitchFamily="18" charset="0"/>
-            </a:endParaRPr>
-          </a:p>
-          <a:p>
-            <a:pPr marL="0" indent="0">
-              <a:buNone/>
-            </a:pPr>
             <a:endParaRPr lang="ro-RO" dirty="0">
               <a:solidFill>
                 <a:schemeClr val="tx1"/>
@@ -4963,12 +4839,18 @@
           <a:p>
             <a:r>
               <a:rPr lang="ro-RO" dirty="0" smtClean="0">
+                <a:solidFill>
+                  <a:schemeClr val="tx1"/>
+                </a:solidFill>
                 <a:latin typeface="Times New Roman" panose="02020603050405020304" pitchFamily="18" charset="0"/>
                 <a:cs typeface="Times New Roman" panose="02020603050405020304" pitchFamily="18" charset="0"/>
               </a:rPr>
               <a:t>Arhitectură</a:t>
             </a:r>
             <a:endParaRPr lang="ro-RO" dirty="0">
+              <a:solidFill>
+                <a:schemeClr val="tx1"/>
+              </a:solidFill>
               <a:latin typeface="Times New Roman" panose="02020603050405020304" pitchFamily="18" charset="0"/>
               <a:cs typeface="Times New Roman" panose="02020603050405020304" pitchFamily="18" charset="0"/>
             </a:endParaRPr>
@@ -5333,7 +5215,7 @@
                 <a:latin typeface="Times New Roman" panose="02020603050405020304" pitchFamily="18" charset="0"/>
                 <a:cs typeface="Times New Roman" panose="02020603050405020304" pitchFamily="18" charset="0"/>
               </a:rPr>
-              <a:t>Exemplu de caz favorabil</a:t>
+              <a:t>Exemplu</a:t>
             </a:r>
             <a:endParaRPr lang="en-US" dirty="0">
               <a:solidFill>
@@ -5600,7 +5482,17 @@
                 <a:latin typeface="Times New Roman" panose="02020603050405020304" pitchFamily="18" charset="0"/>
                 <a:cs typeface="Times New Roman" panose="02020603050405020304" pitchFamily="18" charset="0"/>
               </a:rPr>
-              <a:t>Exemplu de caz favorabil</a:t>
+              <a:t>Exempl</a:t>
+            </a:r>
+            <a:r>
+              <a:rPr lang="en-US" dirty="0" smtClean="0">
+                <a:solidFill>
+                  <a:schemeClr val="tx1"/>
+                </a:solidFill>
+                <a:latin typeface="Times New Roman" panose="02020603050405020304" pitchFamily="18" charset="0"/>
+                <a:cs typeface="Times New Roman" panose="02020603050405020304" pitchFamily="18" charset="0"/>
+              </a:rPr>
+              <a:t>u</a:t>
             </a:r>
             <a:endParaRPr lang="ro-RO" dirty="0">
               <a:solidFill>
@@ -5716,39 +5608,6 @@
           </a:p>
         </p:txBody>
       </p:sp>
-      <p:pic>
-        <p:nvPicPr>
-          <p:cNvPr id="4" name="sc">
-            <a:hlinkClick r:id="" action="ppaction://media"/>
-          </p:cNvPr>
-          <p:cNvPicPr>
-            <a:picLocks noChangeAspect="1"/>
-          </p:cNvPicPr>
-          <p:nvPr>
-            <a:audioFile r:link="rId2"/>
-            <p:extLst>
-              <p:ext uri="{DAA4B4D4-6D71-4841-9C94-3DE7FCFB9230}">
-                <p14:media xmlns:p14="http://schemas.microsoft.com/office/powerpoint/2010/main" r:embed="rId1"/>
-              </p:ext>
-            </p:extLst>
-          </p:nvPr>
-        </p:nvPicPr>
-        <p:blipFill>
-          <a:blip r:embed="rId4"/>
-          <a:stretch>
-            <a:fillRect/>
-          </a:stretch>
-        </p:blipFill>
-        <p:spPr>
-          <a:xfrm>
-            <a:off x="8116338" y="3282696"/>
-            <a:ext cx="1146534" cy="1146534"/>
-          </a:xfrm>
-          <a:prstGeom prst="rect">
-            <a:avLst/>
-          </a:prstGeom>
-        </p:spPr>
-      </p:pic>
       <p:pic>
         <p:nvPicPr>
           <p:cNvPr id="5" name="Picture 4"/>
@@ -5758,7 +5617,7 @@
           <p:nvPr/>
         </p:nvPicPr>
         <p:blipFill>
-          <a:blip r:embed="rId5">
+          <a:blip r:embed="rId4">
             <a:extLst>
               <a:ext uri="{28A0092B-C50C-407E-A947-70E740481C1C}">
                 <a14:useLocalDpi xmlns:a14="http://schemas.microsoft.com/office/drawing/2010/main" val="0"/>
@@ -5773,6 +5632,39 @@
           <a:xfrm>
             <a:off x="1097281" y="2664187"/>
             <a:ext cx="5021014" cy="2236997"/>
+          </a:xfrm>
+          <a:prstGeom prst="rect">
+            <a:avLst/>
+          </a:prstGeom>
+        </p:spPr>
+      </p:pic>
+      <p:pic>
+        <p:nvPicPr>
+          <p:cNvPr id="6" name="sc">
+            <a:hlinkClick r:id="" action="ppaction://media"/>
+          </p:cNvPr>
+          <p:cNvPicPr>
+            <a:picLocks noChangeAspect="1"/>
+          </p:cNvPicPr>
+          <p:nvPr>
+            <a:audioFile r:link="rId2"/>
+            <p:extLst>
+              <p:ext uri="{DAA4B4D4-6D71-4841-9C94-3DE7FCFB9230}">
+                <p14:media xmlns:p14="http://schemas.microsoft.com/office/powerpoint/2010/main" r:embed="rId1"/>
+              </p:ext>
+            </p:extLst>
+          </p:nvPr>
+        </p:nvPicPr>
+        <p:blipFill>
+          <a:blip r:embed="rId5"/>
+          <a:stretch>
+            <a:fillRect/>
+          </a:stretch>
+        </p:blipFill>
+        <p:spPr>
+          <a:xfrm>
+            <a:off x="7932486" y="3078185"/>
+            <a:ext cx="1409002" cy="1408999"/>
           </a:xfrm>
           <a:prstGeom prst="rect">
             <a:avLst/>
@@ -5799,7 +5691,7 @@
                 <p:stCondLst>
                   <p:cond evt="onClick" delay="0">
                     <p:tgtEl>
-                      <p:spTgt spid="4"/>
+                      <p:spTgt spid="6"/>
                     </p:tgtEl>
                   </p:cond>
                 </p:stCondLst>
@@ -5829,7 +5721,7 @@
                                       <p:cBhvr>
                                         <p:cTn id="6" dur="12000" fill="hold"/>
                                         <p:tgtEl>
-                                          <p:spTgt spid="4"/>
+                                          <p:spTgt spid="6"/>
                                         </p:tgtEl>
                                       </p:cBhvr>
                                     </p:cmd>
@@ -5847,7 +5739,7 @@
               <p:nextCondLst>
                 <p:cond evt="onClick" delay="0">
                   <p:tgtEl>
-                    <p:spTgt spid="4"/>
+                    <p:spTgt spid="6"/>
                   </p:tgtEl>
                 </p:cond>
               </p:nextCondLst>
@@ -5867,7 +5759,7 @@
                   </p:endCondLst>
                 </p:cTn>
                 <p:tgtEl>
-                  <p:spTgt spid="4"/>
+                  <p:spTgt spid="6"/>
                 </p:tgtEl>
               </p:cMediaNode>
             </p:audio>
@@ -5880,532 +5772,6 @@
 </file>
 
 <file path=ppt/slides/slide7.xml><?xml version="1.0" encoding="utf-8"?>
-<p:sld xmlns:a="http://schemas.openxmlformats.org/drawingml/2006/main" xmlns:r="http://schemas.openxmlformats.org/officeDocument/2006/relationships" xmlns:p="http://schemas.openxmlformats.org/presentationml/2006/main">
-  <p:cSld>
-    <p:spTree>
-      <p:nvGrpSpPr>
-        <p:cNvPr id="1" name=""/>
-        <p:cNvGrpSpPr/>
-        <p:nvPr/>
-      </p:nvGrpSpPr>
-      <p:grpSpPr>
-        <a:xfrm>
-          <a:off x="0" y="0"/>
-          <a:ext cx="0" cy="0"/>
-          <a:chOff x="0" y="0"/>
-          <a:chExt cx="0" cy="0"/>
-        </a:xfrm>
-      </p:grpSpPr>
-      <p:sp>
-        <p:nvSpPr>
-          <p:cNvPr id="2" name="Title 1"/>
-          <p:cNvSpPr>
-            <a:spLocks noGrp="1"/>
-          </p:cNvSpPr>
-          <p:nvPr>
-            <p:ph type="title"/>
-          </p:nvPr>
-        </p:nvSpPr>
-        <p:spPr/>
-        <p:txBody>
-          <a:bodyPr/>
-          <a:lstStyle/>
-          <a:p>
-            <a:r>
-              <a:rPr lang="ro-RO" dirty="0" smtClean="0">
-                <a:solidFill>
-                  <a:schemeClr val="tx1"/>
-                </a:solidFill>
-                <a:latin typeface="Times New Roman" panose="02020603050405020304" pitchFamily="18" charset="0"/>
-                <a:cs typeface="Times New Roman" panose="02020603050405020304" pitchFamily="18" charset="0"/>
-              </a:rPr>
-              <a:t>Exemplu de caz favorabil</a:t>
-            </a:r>
-            <a:endParaRPr lang="ro-RO" dirty="0">
-              <a:solidFill>
-                <a:schemeClr val="tx1"/>
-              </a:solidFill>
-              <a:latin typeface="Times New Roman" panose="02020603050405020304" pitchFamily="18" charset="0"/>
-              <a:cs typeface="Times New Roman" panose="02020603050405020304" pitchFamily="18" charset="0"/>
-            </a:endParaRPr>
-          </a:p>
-        </p:txBody>
-      </p:sp>
-      <p:sp>
-        <p:nvSpPr>
-          <p:cNvPr id="3" name="Content Placeholder 2"/>
-          <p:cNvSpPr>
-            <a:spLocks noGrp="1"/>
-          </p:cNvSpPr>
-          <p:nvPr>
-            <p:ph idx="1"/>
-          </p:nvPr>
-        </p:nvSpPr>
-        <p:spPr/>
-        <p:txBody>
-          <a:bodyPr>
-            <a:normAutofit/>
-          </a:bodyPr>
-          <a:lstStyle/>
-          <a:p>
-            <a:pPr marL="0" indent="0">
-              <a:lnSpc>
-                <a:spcPct val="100000"/>
-              </a:lnSpc>
-              <a:buNone/>
-            </a:pPr>
-            <a:r>
-              <a:rPr lang="ro-RO" dirty="0">
-                <a:solidFill>
-                  <a:schemeClr val="tx1"/>
-                </a:solidFill>
-                <a:latin typeface="Times New Roman" panose="02020603050405020304" pitchFamily="18" charset="0"/>
-                <a:cs typeface="Times New Roman" panose="02020603050405020304" pitchFamily="18" charset="0"/>
-              </a:rPr>
-              <a:t>Chiar şi în acest caz, estimarea tempoului şi a atacului nu oferă rezultate 100% precise, fapt ce poate fi datorat înregistrării (instrumentul nu este absolut perfect sincronizat cu un metronom), sau doar limitării tehnologiei din prezent şi estimări eronate ale algoritmului</a:t>
-            </a:r>
-            <a:r>
-              <a:rPr lang="ro-RO" dirty="0" smtClean="0">
-                <a:solidFill>
-                  <a:schemeClr val="tx1"/>
-                </a:solidFill>
-                <a:latin typeface="Times New Roman" panose="02020603050405020304" pitchFamily="18" charset="0"/>
-                <a:cs typeface="Times New Roman" panose="02020603050405020304" pitchFamily="18" charset="0"/>
-              </a:rPr>
-              <a:t>.</a:t>
-            </a:r>
-            <a:r>
-              <a:rPr lang="en-US" dirty="0" smtClean="0">
-                <a:solidFill>
-                  <a:schemeClr val="tx1"/>
-                </a:solidFill>
-                <a:latin typeface="Times New Roman" panose="02020603050405020304" pitchFamily="18" charset="0"/>
-                <a:cs typeface="Times New Roman" panose="02020603050405020304" pitchFamily="18" charset="0"/>
-              </a:rPr>
-              <a:t> </a:t>
-            </a:r>
-            <a:r>
-              <a:rPr lang="ro-RO" dirty="0" smtClean="0">
-                <a:solidFill>
-                  <a:schemeClr val="tx1"/>
-                </a:solidFill>
-                <a:latin typeface="Times New Roman" panose="02020603050405020304" pitchFamily="18" charset="0"/>
-                <a:cs typeface="Times New Roman" panose="02020603050405020304" pitchFamily="18" charset="0"/>
-              </a:rPr>
-              <a:t>În particular, </a:t>
-            </a:r>
-            <a:r>
-              <a:rPr lang="ro-RO" dirty="0">
-                <a:solidFill>
-                  <a:schemeClr val="tx1"/>
-                </a:solidFill>
-                <a:latin typeface="Times New Roman" panose="02020603050405020304" pitchFamily="18" charset="0"/>
-                <a:cs typeface="Times New Roman" panose="02020603050405020304" pitchFamily="18" charset="0"/>
-              </a:rPr>
-              <a:t>consider că algoritmul nu este precis datorită amplitudinii constante pe care chitara o are, dar şi faptului că nu există pauze între </a:t>
-            </a:r>
-            <a:r>
-              <a:rPr lang="ro-RO" dirty="0" smtClean="0">
-                <a:solidFill>
-                  <a:schemeClr val="tx1"/>
-                </a:solidFill>
-                <a:latin typeface="Times New Roman" panose="02020603050405020304" pitchFamily="18" charset="0"/>
-                <a:cs typeface="Times New Roman" panose="02020603050405020304" pitchFamily="18" charset="0"/>
-              </a:rPr>
-              <a:t>note (</a:t>
-            </a:r>
-            <a:r>
-              <a:rPr lang="ro-RO" dirty="0">
-                <a:solidFill>
-                  <a:schemeClr val="tx1"/>
-                </a:solidFill>
-                <a:latin typeface="Times New Roman" panose="02020603050405020304" pitchFamily="18" charset="0"/>
-                <a:cs typeface="Times New Roman" panose="02020603050405020304" pitchFamily="18" charset="0"/>
-              </a:rPr>
-              <a:t>d</a:t>
-            </a:r>
-            <a:r>
-              <a:rPr lang="ro-RO" dirty="0" smtClean="0">
-                <a:solidFill>
-                  <a:schemeClr val="tx1"/>
-                </a:solidFill>
-                <a:latin typeface="Times New Roman" panose="02020603050405020304" pitchFamily="18" charset="0"/>
-                <a:cs typeface="Times New Roman" panose="02020603050405020304" pitchFamily="18" charset="0"/>
-              </a:rPr>
-              <a:t>upă </a:t>
-            </a:r>
-            <a:r>
-              <a:rPr lang="ro-RO" dirty="0">
-                <a:solidFill>
-                  <a:schemeClr val="tx1"/>
-                </a:solidFill>
-                <a:latin typeface="Times New Roman" panose="02020603050405020304" pitchFamily="18" charset="0"/>
-                <a:cs typeface="Times New Roman" panose="02020603050405020304" pitchFamily="18" charset="0"/>
-              </a:rPr>
-              <a:t>cum se poate observa în figura de mai </a:t>
-            </a:r>
-            <a:r>
-              <a:rPr lang="ro-RO" dirty="0" smtClean="0">
-                <a:solidFill>
-                  <a:schemeClr val="tx1"/>
-                </a:solidFill>
-                <a:latin typeface="Times New Roman" panose="02020603050405020304" pitchFamily="18" charset="0"/>
-                <a:cs typeface="Times New Roman" panose="02020603050405020304" pitchFamily="18" charset="0"/>
-              </a:rPr>
-              <a:t>jos</a:t>
-            </a:r>
-            <a:r>
-              <a:rPr lang="ro-RO" dirty="0">
-                <a:solidFill>
-                  <a:schemeClr val="tx1"/>
-                </a:solidFill>
-                <a:latin typeface="Times New Roman" panose="02020603050405020304" pitchFamily="18" charset="0"/>
-                <a:cs typeface="Times New Roman" panose="02020603050405020304" pitchFamily="18" charset="0"/>
-              </a:rPr>
-              <a:t>)</a:t>
-            </a:r>
-            <a:r>
-              <a:rPr lang="ro-RO" dirty="0" smtClean="0">
-                <a:solidFill>
-                  <a:schemeClr val="tx1"/>
-                </a:solidFill>
-                <a:latin typeface="Times New Roman" panose="02020603050405020304" pitchFamily="18" charset="0"/>
-                <a:cs typeface="Times New Roman" panose="02020603050405020304" pitchFamily="18" charset="0"/>
-              </a:rPr>
-              <a:t>, </a:t>
-            </a:r>
-            <a:r>
-              <a:rPr lang="ro-RO" dirty="0">
-                <a:solidFill>
-                  <a:schemeClr val="tx1"/>
-                </a:solidFill>
-                <a:latin typeface="Times New Roman" panose="02020603050405020304" pitchFamily="18" charset="0"/>
-                <a:cs typeface="Times New Roman" panose="02020603050405020304" pitchFamily="18" charset="0"/>
-              </a:rPr>
-              <a:t>astfel fiind foarte dificil să se descopere punctele de maxim ce reprezintă atacul notelor, rezultând în erori de estimare</a:t>
-            </a:r>
-            <a:r>
-              <a:rPr lang="ro-RO" dirty="0" smtClean="0">
-                <a:solidFill>
-                  <a:schemeClr val="tx1"/>
-                </a:solidFill>
-                <a:latin typeface="Times New Roman" panose="02020603050405020304" pitchFamily="18" charset="0"/>
-                <a:cs typeface="Times New Roman" panose="02020603050405020304" pitchFamily="18" charset="0"/>
-              </a:rPr>
-              <a:t>. </a:t>
-            </a:r>
-            <a:r>
-              <a:rPr lang="ro-RO" dirty="0">
-                <a:solidFill>
-                  <a:schemeClr val="tx1"/>
-                </a:solidFill>
-                <a:latin typeface="Times New Roman" panose="02020603050405020304" pitchFamily="18" charset="0"/>
-                <a:cs typeface="Times New Roman" panose="02020603050405020304" pitchFamily="18" charset="0"/>
-              </a:rPr>
-              <a:t>În schimb, estimarea frecvenţelor notelor oferă un rezultat promiţător.</a:t>
-            </a:r>
-            <a:endParaRPr lang="en-US" dirty="0">
-              <a:solidFill>
-                <a:schemeClr val="tx1"/>
-              </a:solidFill>
-              <a:latin typeface="Times New Roman" panose="02020603050405020304" pitchFamily="18" charset="0"/>
-              <a:cs typeface="Times New Roman" panose="02020603050405020304" pitchFamily="18" charset="0"/>
-            </a:endParaRPr>
-          </a:p>
-          <a:p>
-            <a:pPr marL="0" indent="0">
-              <a:lnSpc>
-                <a:spcPct val="100000"/>
-              </a:lnSpc>
-              <a:buNone/>
-            </a:pPr>
-            <a:endParaRPr lang="en-US" dirty="0">
-              <a:solidFill>
-                <a:schemeClr val="tx1"/>
-              </a:solidFill>
-              <a:latin typeface="Times New Roman" panose="02020603050405020304" pitchFamily="18" charset="0"/>
-              <a:cs typeface="Times New Roman" panose="02020603050405020304" pitchFamily="18" charset="0"/>
-            </a:endParaRPr>
-          </a:p>
-          <a:p>
-            <a:pPr marL="0" indent="0">
-              <a:lnSpc>
-                <a:spcPct val="100000"/>
-              </a:lnSpc>
-              <a:buNone/>
-            </a:pPr>
-            <a:endParaRPr lang="en-US" dirty="0">
-              <a:solidFill>
-                <a:schemeClr val="tx1"/>
-              </a:solidFill>
-              <a:latin typeface="Times New Roman" panose="02020603050405020304" pitchFamily="18" charset="0"/>
-              <a:cs typeface="Times New Roman" panose="02020603050405020304" pitchFamily="18" charset="0"/>
-            </a:endParaRPr>
-          </a:p>
-          <a:p>
-            <a:pPr marL="0" indent="0">
-              <a:buNone/>
-            </a:pPr>
-            <a:endParaRPr lang="en-US" dirty="0">
-              <a:solidFill>
-                <a:schemeClr val="tx1"/>
-              </a:solidFill>
-              <a:latin typeface="Times New Roman" panose="02020603050405020304" pitchFamily="18" charset="0"/>
-              <a:cs typeface="Times New Roman" panose="02020603050405020304" pitchFamily="18" charset="0"/>
-            </a:endParaRPr>
-          </a:p>
-        </p:txBody>
-      </p:sp>
-      <p:pic>
-        <p:nvPicPr>
-          <p:cNvPr id="6" name="Picture 5"/>
-          <p:cNvPicPr>
-            <a:picLocks noChangeAspect="1"/>
-          </p:cNvPicPr>
-          <p:nvPr/>
-        </p:nvPicPr>
-        <p:blipFill>
-          <a:blip r:embed="rId2">
-            <a:extLst>
-              <a:ext uri="{28A0092B-C50C-407E-A947-70E740481C1C}">
-                <a14:useLocalDpi xmlns:a14="http://schemas.microsoft.com/office/drawing/2010/main" val="0"/>
-              </a:ext>
-            </a:extLst>
-          </a:blip>
-          <a:stretch>
-            <a:fillRect/>
-          </a:stretch>
-        </p:blipFill>
-        <p:spPr>
-          <a:xfrm>
-            <a:off x="3738968" y="4156591"/>
-            <a:ext cx="4775023" cy="1977679"/>
-          </a:xfrm>
-          <a:prstGeom prst="rect">
-            <a:avLst/>
-          </a:prstGeom>
-        </p:spPr>
-      </p:pic>
-    </p:spTree>
-    <p:extLst>
-      <p:ext uri="{BB962C8B-B14F-4D97-AF65-F5344CB8AC3E}">
-        <p14:creationId xmlns:p14="http://schemas.microsoft.com/office/powerpoint/2010/main" val="388745594"/>
-      </p:ext>
-    </p:extLst>
-  </p:cSld>
-  <p:clrMapOvr>
-    <a:masterClrMapping/>
-  </p:clrMapOvr>
-  <p:timing>
-    <p:tnLst>
-      <p:par>
-        <p:cTn id="1" dur="indefinite" restart="never" nodeType="tmRoot"/>
-      </p:par>
-    </p:tnLst>
-  </p:timing>
-</p:sld>
-</file>
-
-<file path=ppt/slides/slide8.xml><?xml version="1.0" encoding="utf-8"?>
-<p:sld xmlns:a="http://schemas.openxmlformats.org/drawingml/2006/main" xmlns:r="http://schemas.openxmlformats.org/officeDocument/2006/relationships" xmlns:p="http://schemas.openxmlformats.org/presentationml/2006/main">
-  <p:cSld>
-    <p:spTree>
-      <p:nvGrpSpPr>
-        <p:cNvPr id="1" name=""/>
-        <p:cNvGrpSpPr/>
-        <p:nvPr/>
-      </p:nvGrpSpPr>
-      <p:grpSpPr>
-        <a:xfrm>
-          <a:off x="0" y="0"/>
-          <a:ext cx="0" cy="0"/>
-          <a:chOff x="0" y="0"/>
-          <a:chExt cx="0" cy="0"/>
-        </a:xfrm>
-      </p:grpSpPr>
-      <p:sp>
-        <p:nvSpPr>
-          <p:cNvPr id="2" name="Title 1"/>
-          <p:cNvSpPr>
-            <a:spLocks noGrp="1"/>
-          </p:cNvSpPr>
-          <p:nvPr>
-            <p:ph type="title"/>
-          </p:nvPr>
-        </p:nvSpPr>
-        <p:spPr/>
-        <p:txBody>
-          <a:bodyPr>
-            <a:normAutofit/>
-          </a:bodyPr>
-          <a:lstStyle/>
-          <a:p>
-            <a:r>
-              <a:rPr lang="ro-RO" dirty="0" smtClean="0">
-                <a:solidFill>
-                  <a:schemeClr val="tx1"/>
-                </a:solidFill>
-                <a:latin typeface="Times New Roman" panose="02020603050405020304" pitchFamily="18" charset="0"/>
-                <a:cs typeface="Times New Roman" panose="02020603050405020304" pitchFamily="18" charset="0"/>
-              </a:rPr>
-              <a:t>Rezultate</a:t>
-            </a:r>
-            <a:endParaRPr lang="ro-RO" dirty="0">
-              <a:solidFill>
-                <a:schemeClr val="tx1"/>
-              </a:solidFill>
-              <a:latin typeface="Times New Roman" panose="02020603050405020304" pitchFamily="18" charset="0"/>
-              <a:cs typeface="Times New Roman" panose="02020603050405020304" pitchFamily="18" charset="0"/>
-            </a:endParaRPr>
-          </a:p>
-        </p:txBody>
-      </p:sp>
-      <p:sp>
-        <p:nvSpPr>
-          <p:cNvPr id="3" name="Content Placeholder 2"/>
-          <p:cNvSpPr>
-            <a:spLocks noGrp="1"/>
-          </p:cNvSpPr>
-          <p:nvPr>
-            <p:ph idx="1"/>
-          </p:nvPr>
-        </p:nvSpPr>
-        <p:spPr/>
-        <p:txBody>
-          <a:bodyPr>
-            <a:normAutofit/>
-          </a:bodyPr>
-          <a:lstStyle/>
-          <a:p>
-            <a:r>
-              <a:rPr lang="ro-RO" dirty="0">
-                <a:solidFill>
-                  <a:schemeClr val="tx1"/>
-                </a:solidFill>
-                <a:latin typeface="Times New Roman" panose="02020603050405020304" pitchFamily="18" charset="0"/>
-                <a:cs typeface="Times New Roman" panose="02020603050405020304" pitchFamily="18" charset="0"/>
-              </a:rPr>
-              <a:t>În practică, aplicaţia ar putea atinge rezultate optime dacă parametrii de intrare ai funcţiilor de estimare a frecvenţelor dominante şi a </a:t>
-            </a:r>
-            <a:r>
-              <a:rPr lang="ro-RO" dirty="0" smtClean="0">
-                <a:solidFill>
-                  <a:schemeClr val="tx1"/>
-                </a:solidFill>
-                <a:latin typeface="Times New Roman" panose="02020603050405020304" pitchFamily="18" charset="0"/>
-                <a:cs typeface="Times New Roman" panose="02020603050405020304" pitchFamily="18" charset="0"/>
-              </a:rPr>
-              <a:t>atacu</a:t>
-            </a:r>
-            <a:r>
-              <a:rPr lang="en-US" dirty="0" err="1" smtClean="0">
-                <a:solidFill>
-                  <a:schemeClr val="tx1"/>
-                </a:solidFill>
-                <a:latin typeface="Times New Roman" panose="02020603050405020304" pitchFamily="18" charset="0"/>
-                <a:cs typeface="Times New Roman" panose="02020603050405020304" pitchFamily="18" charset="0"/>
-              </a:rPr>
-              <a:t>lui</a:t>
-            </a:r>
-            <a:r>
-              <a:rPr lang="ro-RO" dirty="0" smtClean="0">
-                <a:solidFill>
-                  <a:schemeClr val="tx1"/>
-                </a:solidFill>
-                <a:latin typeface="Times New Roman" panose="02020603050405020304" pitchFamily="18" charset="0"/>
-                <a:cs typeface="Times New Roman" panose="02020603050405020304" pitchFamily="18" charset="0"/>
-              </a:rPr>
-              <a:t> </a:t>
-            </a:r>
-            <a:r>
-              <a:rPr lang="ro-RO" dirty="0">
-                <a:solidFill>
-                  <a:schemeClr val="tx1"/>
-                </a:solidFill>
-                <a:latin typeface="Times New Roman" panose="02020603050405020304" pitchFamily="18" charset="0"/>
-                <a:cs typeface="Times New Roman" panose="02020603050405020304" pitchFamily="18" charset="0"/>
-              </a:rPr>
-              <a:t>notelor ar fi modificaţi pentru fiecare input astfel încât să fie obţinut un output grafic vizual mai bun pentru cazul particular respectiv</a:t>
-            </a:r>
-            <a:r>
-              <a:rPr lang="ro-RO" dirty="0" smtClean="0">
-                <a:solidFill>
-                  <a:schemeClr val="tx1"/>
-                </a:solidFill>
-                <a:latin typeface="Times New Roman" panose="02020603050405020304" pitchFamily="18" charset="0"/>
-                <a:cs typeface="Times New Roman" panose="02020603050405020304" pitchFamily="18" charset="0"/>
-              </a:rPr>
-              <a:t>.</a:t>
-            </a:r>
-            <a:endParaRPr lang="en-US" dirty="0" smtClean="0">
-              <a:solidFill>
-                <a:schemeClr val="tx1"/>
-              </a:solidFill>
-              <a:latin typeface="Times New Roman" panose="02020603050405020304" pitchFamily="18" charset="0"/>
-              <a:cs typeface="Times New Roman" panose="02020603050405020304" pitchFamily="18" charset="0"/>
-            </a:endParaRPr>
-          </a:p>
-          <a:p>
-            <a:r>
-              <a:rPr lang="ro-RO" dirty="0" smtClean="0">
-                <a:solidFill>
-                  <a:schemeClr val="tx1"/>
-                </a:solidFill>
-                <a:latin typeface="Times New Roman" panose="02020603050405020304" pitchFamily="18" charset="0"/>
-                <a:cs typeface="Times New Roman" panose="02020603050405020304" pitchFamily="18" charset="0"/>
-              </a:rPr>
-              <a:t>Exemplu</a:t>
-            </a:r>
-            <a:r>
-              <a:rPr lang="en-US" dirty="0" smtClean="0">
-                <a:solidFill>
-                  <a:schemeClr val="tx1"/>
-                </a:solidFill>
-                <a:latin typeface="Times New Roman" panose="02020603050405020304" pitchFamily="18" charset="0"/>
-                <a:cs typeface="Times New Roman" panose="02020603050405020304" pitchFamily="18" charset="0"/>
-              </a:rPr>
-              <a:t>:</a:t>
-            </a:r>
-            <a:endParaRPr lang="ro-RO" dirty="0" smtClean="0">
-              <a:solidFill>
-                <a:schemeClr val="tx1"/>
-              </a:solidFill>
-              <a:latin typeface="Times New Roman" panose="02020603050405020304" pitchFamily="18" charset="0"/>
-              <a:cs typeface="Times New Roman" panose="02020603050405020304" pitchFamily="18" charset="0"/>
-            </a:endParaRPr>
-          </a:p>
-          <a:p>
-            <a:endParaRPr lang="ro-RO" dirty="0">
-              <a:solidFill>
-                <a:schemeClr val="tx1"/>
-              </a:solidFill>
-              <a:latin typeface="Times New Roman" panose="02020603050405020304" pitchFamily="18" charset="0"/>
-              <a:cs typeface="Times New Roman" panose="02020603050405020304" pitchFamily="18" charset="0"/>
-            </a:endParaRPr>
-          </a:p>
-        </p:txBody>
-      </p:sp>
-    </p:spTree>
-    <p:extLst>
-      <p:ext uri="{BB962C8B-B14F-4D97-AF65-F5344CB8AC3E}">
-        <p14:creationId xmlns:p14="http://schemas.microsoft.com/office/powerpoint/2010/main" val="4117141510"/>
-      </p:ext>
-    </p:extLst>
-  </p:cSld>
-  <p:clrMapOvr>
-    <a:masterClrMapping/>
-  </p:clrMapOvr>
-  <p:timing>
-    <p:tnLst>
-      <p:par>
-        <p:cTn id="1" dur="indefinite" restart="never" nodeType="tmRoot"/>
-      </p:par>
-    </p:tnLst>
-  </p:timing>
-</p:sld>
-</file>
-
-<file path=ppt/slides/slide9.xml><?xml version="1.0" encoding="utf-8"?>
 <p:sld xmlns:a="http://schemas.openxmlformats.org/drawingml/2006/main" xmlns:r="http://schemas.openxmlformats.org/officeDocument/2006/relationships" xmlns:p="http://schemas.openxmlformats.org/presentationml/2006/main">
   <p:cSld>
     <p:spTree>
@@ -6456,6 +5822,256 @@
     <p:extLst>
       <p:ext uri="{BB962C8B-B14F-4D97-AF65-F5344CB8AC3E}">
         <p14:creationId xmlns:p14="http://schemas.microsoft.com/office/powerpoint/2010/main" val="1619976882"/>
+      </p:ext>
+    </p:extLst>
+  </p:cSld>
+  <p:clrMapOvr>
+    <a:masterClrMapping/>
+  </p:clrMapOvr>
+  <p:timing>
+    <p:tnLst>
+      <p:par>
+        <p:cTn id="1" dur="indefinite" restart="never" nodeType="tmRoot"/>
+      </p:par>
+    </p:tnLst>
+  </p:timing>
+</p:sld>
+</file>
+
+<file path=ppt/slides/slide8.xml><?xml version="1.0" encoding="utf-8"?>
+<p:sld xmlns:a="http://schemas.openxmlformats.org/drawingml/2006/main" xmlns:r="http://schemas.openxmlformats.org/officeDocument/2006/relationships" xmlns:p="http://schemas.openxmlformats.org/presentationml/2006/main">
+  <p:cSld>
+    <p:spTree>
+      <p:nvGrpSpPr>
+        <p:cNvPr id="1" name=""/>
+        <p:cNvGrpSpPr/>
+        <p:nvPr/>
+      </p:nvGrpSpPr>
+      <p:grpSpPr>
+        <a:xfrm>
+          <a:off x="0" y="0"/>
+          <a:ext cx="0" cy="0"/>
+          <a:chOff x="0" y="0"/>
+          <a:chExt cx="0" cy="0"/>
+        </a:xfrm>
+      </p:grpSpPr>
+      <p:sp>
+        <p:nvSpPr>
+          <p:cNvPr id="2" name="Title 1"/>
+          <p:cNvSpPr>
+            <a:spLocks noGrp="1"/>
+          </p:cNvSpPr>
+          <p:nvPr>
+            <p:ph type="title"/>
+          </p:nvPr>
+        </p:nvSpPr>
+        <p:spPr/>
+        <p:txBody>
+          <a:bodyPr>
+            <a:normAutofit/>
+          </a:bodyPr>
+          <a:lstStyle/>
+          <a:p>
+            <a:r>
+              <a:rPr lang="ro-RO" dirty="0" smtClean="0">
+                <a:solidFill>
+                  <a:schemeClr val="tx1"/>
+                </a:solidFill>
+                <a:latin typeface="Times New Roman" panose="02020603050405020304" pitchFamily="18" charset="0"/>
+                <a:cs typeface="Times New Roman" panose="02020603050405020304" pitchFamily="18" charset="0"/>
+              </a:rPr>
+              <a:t>Compararea cu alte partituri</a:t>
+            </a:r>
+            <a:endParaRPr lang="ro-RO" dirty="0">
+              <a:solidFill>
+                <a:schemeClr val="tx1"/>
+              </a:solidFill>
+              <a:latin typeface="Times New Roman" panose="02020603050405020304" pitchFamily="18" charset="0"/>
+              <a:cs typeface="Times New Roman" panose="02020603050405020304" pitchFamily="18" charset="0"/>
+            </a:endParaRPr>
+          </a:p>
+        </p:txBody>
+      </p:sp>
+      <p:sp>
+        <p:nvSpPr>
+          <p:cNvPr id="3" name="Content Placeholder 2"/>
+          <p:cNvSpPr>
+            <a:spLocks noGrp="1"/>
+          </p:cNvSpPr>
+          <p:nvPr>
+            <p:ph idx="1"/>
+          </p:nvPr>
+        </p:nvSpPr>
+        <p:spPr/>
+        <p:txBody>
+          <a:bodyPr/>
+          <a:lstStyle/>
+          <a:p>
+            <a:r>
+              <a:rPr lang="ro-RO" dirty="0">
+                <a:solidFill>
+                  <a:schemeClr val="tx1"/>
+                </a:solidFill>
+                <a:latin typeface="Times New Roman" panose="02020603050405020304" pitchFamily="18" charset="0"/>
+                <a:cs typeface="Times New Roman" panose="02020603050405020304" pitchFamily="18" charset="0"/>
+              </a:rPr>
+              <a:t>Inovaţia adusă de aplicaţia PianoFollower este interfaţa de comparat partituri. Nu am găsit în nicio altă aplicaţie un modul de comparat partituri, înafară de MuseScore, dar, chiar şi acolo, compararea se face doar în mod text şi nu în mod grafic.</a:t>
+            </a:r>
+            <a:endParaRPr lang="en-US" dirty="0">
+              <a:solidFill>
+                <a:schemeClr val="tx1"/>
+              </a:solidFill>
+              <a:latin typeface="Times New Roman" panose="02020603050405020304" pitchFamily="18" charset="0"/>
+              <a:cs typeface="Times New Roman" panose="02020603050405020304" pitchFamily="18" charset="0"/>
+            </a:endParaRPr>
+          </a:p>
+          <a:p>
+            <a:endParaRPr lang="ro-RO" dirty="0"/>
+          </a:p>
+        </p:txBody>
+      </p:sp>
+      <p:pic>
+        <p:nvPicPr>
+          <p:cNvPr id="1044" name="Picture 1043"/>
+          <p:cNvPicPr>
+            <a:picLocks noChangeAspect="1"/>
+          </p:cNvPicPr>
+          <p:nvPr/>
+        </p:nvPicPr>
+        <p:blipFill>
+          <a:blip r:embed="rId2" cstate="print">
+            <a:extLst>
+              <a:ext uri="{28A0092B-C50C-407E-A947-70E740481C1C}">
+                <a14:useLocalDpi xmlns:a14="http://schemas.microsoft.com/office/drawing/2010/main" val="0"/>
+              </a:ext>
+            </a:extLst>
+          </a:blip>
+          <a:stretch>
+            <a:fillRect/>
+          </a:stretch>
+        </p:blipFill>
+        <p:spPr>
+          <a:xfrm>
+            <a:off x="1097280" y="3176568"/>
+            <a:ext cx="5069237" cy="2692526"/>
+          </a:xfrm>
+          <a:prstGeom prst="rect">
+            <a:avLst/>
+          </a:prstGeom>
+        </p:spPr>
+      </p:pic>
+      <p:sp>
+        <p:nvSpPr>
+          <p:cNvPr id="1045" name="TextBox 1044"/>
+          <p:cNvSpPr txBox="1"/>
+          <p:nvPr/>
+        </p:nvSpPr>
+        <p:spPr>
+          <a:xfrm>
+            <a:off x="6473952" y="3176568"/>
+            <a:ext cx="3712464" cy="1938992"/>
+          </a:xfrm>
+          <a:prstGeom prst="rect">
+            <a:avLst/>
+          </a:prstGeom>
+          <a:noFill/>
+        </p:spPr>
+        <p:txBody>
+          <a:bodyPr wrap="square" rtlCol="0">
+            <a:spAutoFit/>
+          </a:bodyPr>
+          <a:lstStyle/>
+          <a:p>
+            <a:r>
+              <a:rPr lang="ro-RO" sz="2000" dirty="0">
+                <a:latin typeface="Times New Roman" panose="02020603050405020304" pitchFamily="18" charset="0"/>
+                <a:cs typeface="Times New Roman" panose="02020603050405020304" pitchFamily="18" charset="0"/>
+              </a:rPr>
+              <a:t>Acest exemplu prezintă compararea a două partituri. După cum se poate observa, graficele reprezentate de axele note şi timp sunt identice, fapt ce semnalează că şi partiturile input sunt identice.</a:t>
+            </a:r>
+            <a:endParaRPr lang="en-US" sz="2000" dirty="0">
+              <a:latin typeface="Times New Roman" panose="02020603050405020304" pitchFamily="18" charset="0"/>
+              <a:cs typeface="Times New Roman" panose="02020603050405020304" pitchFamily="18" charset="0"/>
+            </a:endParaRPr>
+          </a:p>
+        </p:txBody>
+      </p:sp>
+    </p:spTree>
+    <p:extLst>
+      <p:ext uri="{BB962C8B-B14F-4D97-AF65-F5344CB8AC3E}">
+        <p14:creationId xmlns:p14="http://schemas.microsoft.com/office/powerpoint/2010/main" val="3998745293"/>
+      </p:ext>
+    </p:extLst>
+  </p:cSld>
+  <p:clrMapOvr>
+    <a:masterClrMapping/>
+  </p:clrMapOvr>
+  <p:timing>
+    <p:tnLst>
+      <p:par>
+        <p:cTn id="1" dur="indefinite" restart="never" nodeType="tmRoot"/>
+      </p:par>
+    </p:tnLst>
+  </p:timing>
+</p:sld>
+</file>
+
+<file path=ppt/slides/slide9.xml><?xml version="1.0" encoding="utf-8"?>
+<p:sld xmlns:a="http://schemas.openxmlformats.org/drawingml/2006/main" xmlns:r="http://schemas.openxmlformats.org/officeDocument/2006/relationships" xmlns:p="http://schemas.openxmlformats.org/presentationml/2006/main">
+  <p:cSld>
+    <p:spTree>
+      <p:nvGrpSpPr>
+        <p:cNvPr id="1" name=""/>
+        <p:cNvGrpSpPr/>
+        <p:nvPr/>
+      </p:nvGrpSpPr>
+      <p:grpSpPr>
+        <a:xfrm>
+          <a:off x="0" y="0"/>
+          <a:ext cx="0" cy="0"/>
+          <a:chOff x="0" y="0"/>
+          <a:chExt cx="0" cy="0"/>
+        </a:xfrm>
+      </p:grpSpPr>
+      <p:sp>
+        <p:nvSpPr>
+          <p:cNvPr id="2" name="Title 1"/>
+          <p:cNvSpPr>
+            <a:spLocks noGrp="1"/>
+          </p:cNvSpPr>
+          <p:nvPr>
+            <p:ph type="title"/>
+          </p:nvPr>
+        </p:nvSpPr>
+        <p:spPr/>
+        <p:txBody>
+          <a:bodyPr/>
+          <a:lstStyle/>
+          <a:p>
+            <a:r>
+              <a:rPr lang="en-US" dirty="0" smtClean="0">
+                <a:solidFill>
+                  <a:schemeClr val="tx1"/>
+                </a:solidFill>
+                <a:latin typeface="Times New Roman" panose="02020603050405020304" pitchFamily="18" charset="0"/>
+                <a:cs typeface="Times New Roman" panose="02020603050405020304" pitchFamily="18" charset="0"/>
+              </a:rPr>
+              <a:t>Demo</a:t>
+            </a:r>
+            <a:endParaRPr lang="ro-RO" dirty="0">
+              <a:solidFill>
+                <a:schemeClr val="tx1"/>
+              </a:solidFill>
+              <a:latin typeface="Times New Roman" panose="02020603050405020304" pitchFamily="18" charset="0"/>
+              <a:cs typeface="Times New Roman" panose="02020603050405020304" pitchFamily="18" charset="0"/>
+            </a:endParaRPr>
+          </a:p>
+        </p:txBody>
+      </p:sp>
+    </p:spTree>
+    <p:extLst>
+      <p:ext uri="{BB962C8B-B14F-4D97-AF65-F5344CB8AC3E}">
+        <p14:creationId xmlns:p14="http://schemas.microsoft.com/office/powerpoint/2010/main" val="602976053"/>
       </p:ext>
     </p:extLst>
   </p:cSld>

</xml_diff>

<commit_message>
fixed some bugs and added example files
</commit_message>
<xml_diff>
--- a/Licenta2020CrivoiAndrei/Crivoi Andrei Prezentare Licenta.pptx
+++ b/Licenta2020CrivoiAndrei/Crivoi Andrei Prezentare Licenta.pptx
@@ -206,7 +206,7 @@
           <a:p>
             <a:fld id="{A4382D98-FC04-4C63-8970-18303CA92AC7}" type="datetimeFigureOut">
               <a:rPr lang="en-US" smtClean="0"/>
-              <a:t>11-Feb-20</a:t>
+              <a:t>12-Feb-20</a:t>
             </a:fld>
             <a:endParaRPr lang="en-US"/>
           </a:p>
@@ -786,7 +786,7 @@
           <a:p>
             <a:fld id="{B8249082-1355-4FA8-AA26-5D0D49FEC7D8}" type="datetimeFigureOut">
               <a:rPr lang="en-US" smtClean="0"/>
-              <a:t>11-Feb-20</a:t>
+              <a:t>12-Feb-20</a:t>
             </a:fld>
             <a:endParaRPr lang="en-US"/>
           </a:p>
@@ -994,7 +994,7 @@
           <a:p>
             <a:fld id="{B8249082-1355-4FA8-AA26-5D0D49FEC7D8}" type="datetimeFigureOut">
               <a:rPr lang="en-US" smtClean="0"/>
-              <a:t>11-Feb-20</a:t>
+              <a:t>12-Feb-20</a:t>
             </a:fld>
             <a:endParaRPr lang="en-US"/>
           </a:p>
@@ -1252,7 +1252,7 @@
           <a:p>
             <a:fld id="{B8249082-1355-4FA8-AA26-5D0D49FEC7D8}" type="datetimeFigureOut">
               <a:rPr lang="en-US" smtClean="0"/>
-              <a:t>11-Feb-20</a:t>
+              <a:t>12-Feb-20</a:t>
             </a:fld>
             <a:endParaRPr lang="en-US"/>
           </a:p>
@@ -1422,7 +1422,7 @@
           <a:p>
             <a:fld id="{B8249082-1355-4FA8-AA26-5D0D49FEC7D8}" type="datetimeFigureOut">
               <a:rPr lang="en-US" smtClean="0"/>
-              <a:t>11-Feb-20</a:t>
+              <a:t>12-Feb-20</a:t>
             </a:fld>
             <a:endParaRPr lang="en-US"/>
           </a:p>
@@ -1759,7 +1759,7 @@
           <a:p>
             <a:fld id="{B8249082-1355-4FA8-AA26-5D0D49FEC7D8}" type="datetimeFigureOut">
               <a:rPr lang="en-US" smtClean="0"/>
-              <a:t>11-Feb-20</a:t>
+              <a:t>12-Feb-20</a:t>
             </a:fld>
             <a:endParaRPr lang="en-US"/>
           </a:p>
@@ -2034,7 +2034,7 @@
           <a:p>
             <a:fld id="{B8249082-1355-4FA8-AA26-5D0D49FEC7D8}" type="datetimeFigureOut">
               <a:rPr lang="en-US" smtClean="0"/>
-              <a:t>11-Feb-20</a:t>
+              <a:t>12-Feb-20</a:t>
             </a:fld>
             <a:endParaRPr lang="en-US"/>
           </a:p>
@@ -2413,7 +2413,7 @@
           <a:p>
             <a:fld id="{B8249082-1355-4FA8-AA26-5D0D49FEC7D8}" type="datetimeFigureOut">
               <a:rPr lang="en-US" smtClean="0"/>
-              <a:t>11-Feb-20</a:t>
+              <a:t>12-Feb-20</a:t>
             </a:fld>
             <a:endParaRPr lang="en-US"/>
           </a:p>
@@ -2531,7 +2531,7 @@
           <a:p>
             <a:fld id="{B8249082-1355-4FA8-AA26-5D0D49FEC7D8}" type="datetimeFigureOut">
               <a:rPr lang="en-US" smtClean="0"/>
-              <a:t>11-Feb-20</a:t>
+              <a:t>12-Feb-20</a:t>
             </a:fld>
             <a:endParaRPr lang="en-US"/>
           </a:p>
@@ -2704,7 +2704,7 @@
           <a:p>
             <a:fld id="{B8249082-1355-4FA8-AA26-5D0D49FEC7D8}" type="datetimeFigureOut">
               <a:rPr lang="en-US" smtClean="0"/>
-              <a:t>11-Feb-20</a:t>
+              <a:t>12-Feb-20</a:t>
             </a:fld>
             <a:endParaRPr lang="en-US"/>
           </a:p>
@@ -3060,7 +3060,7 @@
           <a:p>
             <a:fld id="{B8249082-1355-4FA8-AA26-5D0D49FEC7D8}" type="datetimeFigureOut">
               <a:rPr lang="en-US" smtClean="0"/>
-              <a:t>11-Feb-20</a:t>
+              <a:t>12-Feb-20</a:t>
             </a:fld>
             <a:endParaRPr lang="en-US"/>
           </a:p>
@@ -3439,7 +3439,7 @@
           <a:p>
             <a:fld id="{B8249082-1355-4FA8-AA26-5D0D49FEC7D8}" type="datetimeFigureOut">
               <a:rPr lang="en-US" smtClean="0"/>
-              <a:t>11-Feb-20</a:t>
+              <a:t>12-Feb-20</a:t>
             </a:fld>
             <a:endParaRPr lang="en-US"/>
           </a:p>
@@ -3728,7 +3728,7 @@
           <a:p>
             <a:fld id="{B8249082-1355-4FA8-AA26-5D0D49FEC7D8}" type="datetimeFigureOut">
               <a:rPr lang="en-US" smtClean="0"/>
-              <a:t>11-Feb-20</a:t>
+              <a:t>12-Feb-20</a:t>
             </a:fld>
             <a:endParaRPr lang="en-US"/>
           </a:p>
@@ -4276,12 +4276,18 @@
           <a:p>
             <a:r>
               <a:rPr lang="en-US" dirty="0" smtClean="0">
+                <a:solidFill>
+                  <a:schemeClr val="tx1"/>
+                </a:solidFill>
                 <a:latin typeface="Times New Roman" panose="02020603050405020304" pitchFamily="18" charset="0"/>
                 <a:cs typeface="Times New Roman" panose="02020603050405020304" pitchFamily="18" charset="0"/>
               </a:rPr>
               <a:t>Piano Follower</a:t>
             </a:r>
             <a:endParaRPr lang="en-US" dirty="0">
+              <a:solidFill>
+                <a:schemeClr val="tx1"/>
+              </a:solidFill>
               <a:latin typeface="Times New Roman" panose="02020603050405020304" pitchFamily="18" charset="0"/>
               <a:cs typeface="Times New Roman" panose="02020603050405020304" pitchFamily="18" charset="0"/>
             </a:endParaRPr>
@@ -4458,7 +4464,7 @@
           <a:bodyPr/>
           <a:lstStyle/>
           <a:p>
-            <a:endParaRPr lang="ro-RO"/>
+            <a:endParaRPr lang="ro-RO" dirty="0"/>
           </a:p>
         </p:txBody>
       </p:sp>
@@ -4477,7 +4483,7 @@
           <a:bodyPr/>
           <a:lstStyle/>
           <a:p>
-            <a:endParaRPr lang="ro-RO"/>
+            <a:endParaRPr lang="ro-RO" dirty="0"/>
           </a:p>
         </p:txBody>
       </p:sp>
@@ -4491,6 +4497,13 @@
   <p:clrMapOvr>
     <a:masterClrMapping/>
   </p:clrMapOvr>
+  <p:timing>
+    <p:tnLst>
+      <p:par>
+        <p:cTn id="1" dur="indefinite" restart="never" nodeType="tmRoot"/>
+      </p:par>
+    </p:tnLst>
+  </p:timing>
 </p:sld>
 </file>
 
@@ -4612,7 +4625,47 @@
                 <a:latin typeface="Times New Roman" panose="02020603050405020304" pitchFamily="18" charset="0"/>
                 <a:cs typeface="Times New Roman" panose="02020603050405020304" pitchFamily="18" charset="0"/>
               </a:rPr>
-              <a:t>Această aplicaţie prezintă următoarele funţionalităţi:</a:t>
+              <a:t>Această aplicaţie prezintă următoarele </a:t>
+            </a:r>
+            <a:r>
+              <a:rPr lang="ro-RO" dirty="0" smtClean="0">
+                <a:solidFill>
+                  <a:schemeClr val="tx1"/>
+                </a:solidFill>
+                <a:latin typeface="Times New Roman" panose="02020603050405020304" pitchFamily="18" charset="0"/>
+                <a:cs typeface="Times New Roman" panose="02020603050405020304" pitchFamily="18" charset="0"/>
+              </a:rPr>
+              <a:t>fun</a:t>
+            </a:r>
+            <a:r>
+              <a:rPr lang="en-US" dirty="0" smtClean="0">
+                <a:solidFill>
+                  <a:schemeClr val="tx1"/>
+                </a:solidFill>
+                <a:latin typeface="Times New Roman" panose="02020603050405020304" pitchFamily="18" charset="0"/>
+                <a:cs typeface="Times New Roman" panose="02020603050405020304" pitchFamily="18" charset="0"/>
+              </a:rPr>
+              <a:t>c</a:t>
+            </a:r>
+            <a:r>
+              <a:rPr lang="ro-RO" dirty="0" smtClean="0">
+                <a:solidFill>
+                  <a:schemeClr val="tx1"/>
+                </a:solidFill>
+                <a:latin typeface="Times New Roman" panose="02020603050405020304" pitchFamily="18" charset="0"/>
+                <a:cs typeface="Times New Roman" panose="02020603050405020304" pitchFamily="18" charset="0"/>
+              </a:rPr>
+              <a:t>ţionalităţi</a:t>
+            </a:r>
+            <a:r>
+              <a:rPr lang="ro-RO" dirty="0">
+                <a:solidFill>
+                  <a:schemeClr val="tx1"/>
+                </a:solidFill>
+                <a:latin typeface="Times New Roman" panose="02020603050405020304" pitchFamily="18" charset="0"/>
+                <a:cs typeface="Times New Roman" panose="02020603050405020304" pitchFamily="18" charset="0"/>
+              </a:rPr>
+              <a:t>:</a:t>
             </a:r>
             <a:endParaRPr lang="en-US" dirty="0">
               <a:solidFill>
@@ -4859,7 +4912,7 @@
       </p:sp>
       <p:pic>
         <p:nvPicPr>
-          <p:cNvPr id="4" name="Content Placeholder 3"/>
+          <p:cNvPr id="5" name="Content Placeholder 4"/>
           <p:cNvPicPr>
             <a:picLocks noGrp="1" noChangeAspect="1"/>
           </p:cNvPicPr>
@@ -4868,7 +4921,7 @@
           </p:nvPr>
         </p:nvPicPr>
         <p:blipFill>
-          <a:blip r:embed="rId2" cstate="print">
+          <a:blip r:embed="rId2">
             <a:extLst>
               <a:ext uri="{28A0092B-C50C-407E-A947-70E740481C1C}">
                 <a14:useLocalDpi xmlns:a14="http://schemas.microsoft.com/office/drawing/2010/main" val="0"/>
@@ -4881,8 +4934,8 @@
         </p:blipFill>
         <p:spPr>
           <a:xfrm>
-            <a:off x="3968496" y="286603"/>
-            <a:ext cx="8223504" cy="5698542"/>
+            <a:off x="2502725" y="1846263"/>
+            <a:ext cx="7246875" cy="4022725"/>
           </a:xfrm>
         </p:spPr>
       </p:pic>
@@ -4896,6 +4949,13 @@
   <p:clrMapOvr>
     <a:masterClrMapping/>
   </p:clrMapOvr>
+  <p:timing>
+    <p:tnLst>
+      <p:par>
+        <p:cTn id="1" dur="indefinite" restart="never" nodeType="tmRoot"/>
+      </p:par>
+    </p:tnLst>
+  </p:timing>
 </p:sld>
 </file>
 
@@ -5110,7 +5170,27 @@
                 <a:latin typeface="Times New Roman" panose="02020603050405020304" pitchFamily="18" charset="0"/>
                 <a:cs typeface="Times New Roman" panose="02020603050405020304" pitchFamily="18" charset="0"/>
               </a:rPr>
-              <a:t>Detectarea începutului/finalului notelor</a:t>
+              <a:t>Detectarea </a:t>
+            </a:r>
+            <a:r>
+              <a:rPr lang="en-US" dirty="0" smtClean="0">
+                <a:solidFill>
+                  <a:schemeClr val="tx1"/>
+                </a:solidFill>
+                <a:latin typeface="Times New Roman" panose="02020603050405020304" pitchFamily="18" charset="0"/>
+                <a:cs typeface="Times New Roman" panose="02020603050405020304" pitchFamily="18" charset="0"/>
+              </a:rPr>
+              <a:t>atacului </a:t>
+            </a:r>
+            <a:r>
+              <a:rPr lang="ro-RO" dirty="0" smtClean="0">
+                <a:solidFill>
+                  <a:schemeClr val="tx1"/>
+                </a:solidFill>
+                <a:latin typeface="Times New Roman" panose="02020603050405020304" pitchFamily="18" charset="0"/>
+                <a:cs typeface="Times New Roman" panose="02020603050405020304" pitchFamily="18" charset="0"/>
+              </a:rPr>
+              <a:t>notelor</a:t>
             </a:r>
             <a:endParaRPr lang="en-US" dirty="0">
               <a:solidFill>

</xml_diff>